<commit_message>
Presentation and bonus work
Added bonus to the repository and worked on the presentation. Technical background should be completed as well as objectives, unless I complete the bonus. Then I will need to alter these somewhat
</commit_message>
<xml_diff>
--- a/project_report.pptx
+++ b/project_report.pptx
@@ -5,20 +5,23 @@
     <p:sldMasterId id="2147483660" r:id="rId1"/>
   </p:sldMasterIdLst>
   <p:notesMasterIdLst>
-    <p:notesMasterId r:id="rId13"/>
+    <p:notesMasterId r:id="rId16"/>
   </p:notesMasterIdLst>
   <p:sldIdLst>
     <p:sldId id="256" r:id="rId2"/>
     <p:sldId id="257" r:id="rId3"/>
     <p:sldId id="258" r:id="rId4"/>
-    <p:sldId id="265" r:id="rId5"/>
-    <p:sldId id="266" r:id="rId6"/>
-    <p:sldId id="260" r:id="rId7"/>
-    <p:sldId id="267" r:id="rId8"/>
-    <p:sldId id="261" r:id="rId9"/>
-    <p:sldId id="269" r:id="rId10"/>
-    <p:sldId id="270" r:id="rId11"/>
-    <p:sldId id="268" r:id="rId12"/>
+    <p:sldId id="271" r:id="rId5"/>
+    <p:sldId id="272" r:id="rId6"/>
+    <p:sldId id="273" r:id="rId7"/>
+    <p:sldId id="265" r:id="rId8"/>
+    <p:sldId id="266" r:id="rId9"/>
+    <p:sldId id="260" r:id="rId10"/>
+    <p:sldId id="267" r:id="rId11"/>
+    <p:sldId id="261" r:id="rId12"/>
+    <p:sldId id="269" r:id="rId13"/>
+    <p:sldId id="270" r:id="rId14"/>
+    <p:sldId id="268" r:id="rId15"/>
   </p:sldIdLst>
   <p:sldSz cx="12192000" cy="6858000"/>
   <p:notesSz cx="6858000" cy="9144000"/>
@@ -207,7 +210,7 @@
           <a:p>
             <a:fld id="{4B95B036-E2C6-401F-9AF0-76A610D455EF}" type="datetimeFigureOut">
               <a:rPr lang="en-US" smtClean="0"/>
-              <a:t>2/28/2024</a:t>
+              <a:t>2/29/2024</a:t>
             </a:fld>
             <a:endParaRPr lang="en-US"/>
           </a:p>
@@ -1196,7 +1199,7 @@
           <a:p>
             <a:fld id="{1F5DD513-C252-45BC-9A4E-3640A510945B}" type="datetime1">
               <a:rPr lang="en-US" smtClean="0"/>
-              <a:t>2/28/2024</a:t>
+              <a:t>2/29/2024</a:t>
             </a:fld>
             <a:endParaRPr lang="en-US"/>
           </a:p>
@@ -1447,7 +1450,7 @@
           <a:p>
             <a:fld id="{F5E8E352-C2EE-4240-990B-7465E3237F5A}" type="datetime1">
               <a:rPr lang="en-US" smtClean="0"/>
-              <a:t>2/28/2024</a:t>
+              <a:t>2/29/2024</a:t>
             </a:fld>
             <a:endParaRPr lang="en-US"/>
           </a:p>
@@ -1761,7 +1764,7 @@
           <a:p>
             <a:fld id="{38C74731-BBBA-4773-A7F7-61E6712D248E}" type="datetime1">
               <a:rPr lang="en-US" smtClean="0"/>
-              <a:t>2/28/2024</a:t>
+              <a:t>2/29/2024</a:t>
             </a:fld>
             <a:endParaRPr lang="en-US"/>
           </a:p>
@@ -2102,7 +2105,7 @@
           <a:p>
             <a:fld id="{28136DEB-F1F0-471B-8C1E-0370304C5B9D}" type="datetime1">
               <a:rPr lang="en-US" smtClean="0"/>
-              <a:t>2/28/2024</a:t>
+              <a:t>2/29/2024</a:t>
             </a:fld>
             <a:endParaRPr lang="en-US"/>
           </a:p>
@@ -2416,7 +2419,7 @@
           <a:p>
             <a:fld id="{75BECDEE-49C4-40AA-825C-33A285B5F837}" type="datetime1">
               <a:rPr lang="en-US" smtClean="0"/>
-              <a:t>2/28/2024</a:t>
+              <a:t>2/29/2024</a:t>
             </a:fld>
             <a:endParaRPr lang="en-US"/>
           </a:p>
@@ -2809,7 +2812,7 @@
           <a:p>
             <a:fld id="{307488C5-BB3F-4F2A-A290-B2F1BED0D39A}" type="datetime1">
               <a:rPr lang="en-US" smtClean="0"/>
-              <a:t>2/28/2024</a:t>
+              <a:t>2/29/2024</a:t>
             </a:fld>
             <a:endParaRPr lang="en-US"/>
           </a:p>
@@ -2979,7 +2982,7 @@
           <a:p>
             <a:fld id="{17E9D638-BA18-4B47-82D7-86A75F7C87B8}" type="datetime1">
               <a:rPr lang="en-US" smtClean="0"/>
-              <a:t>2/28/2024</a:t>
+              <a:t>2/29/2024</a:t>
             </a:fld>
             <a:endParaRPr lang="en-US"/>
           </a:p>
@@ -3159,7 +3162,7 @@
           <a:p>
             <a:fld id="{FFCE974E-CACC-4E8C-868E-0B097E66F771}" type="datetime1">
               <a:rPr lang="en-US" smtClean="0"/>
-              <a:t>2/28/2024</a:t>
+              <a:t>2/29/2024</a:t>
             </a:fld>
             <a:endParaRPr lang="en-US"/>
           </a:p>
@@ -3340,7 +3343,7 @@
           <a:p>
             <a:fld id="{B9FA7D55-3D67-49FF-874F-47B686DA8F27}" type="datetime1">
               <a:rPr lang="en-US" smtClean="0"/>
-              <a:t>2/28/2024</a:t>
+              <a:t>2/29/2024</a:t>
             </a:fld>
             <a:endParaRPr lang="en-US"/>
           </a:p>
@@ -3597,7 +3600,7 @@
           <a:p>
             <a:fld id="{B6A64CD3-CF8A-4223-9829-A113004C01D6}" type="datetime1">
               <a:rPr lang="en-US" smtClean="0"/>
-              <a:t>2/28/2024</a:t>
+              <a:t>2/29/2024</a:t>
             </a:fld>
             <a:endParaRPr lang="en-US"/>
           </a:p>
@@ -3829,7 +3832,7 @@
           <a:p>
             <a:fld id="{B2A041E4-FCA4-407A-829F-AC860CFB0347}" type="datetime1">
               <a:rPr lang="en-US" smtClean="0"/>
-              <a:t>2/28/2024</a:t>
+              <a:t>2/29/2024</a:t>
             </a:fld>
             <a:endParaRPr lang="en-US"/>
           </a:p>
@@ -4203,7 +4206,7 @@
           <a:p>
             <a:fld id="{435A65AA-222C-43F5-9A87-C916A27EF1F2}" type="datetime1">
               <a:rPr lang="en-US" smtClean="0"/>
-              <a:t>2/28/2024</a:t>
+              <a:t>2/29/2024</a:t>
             </a:fld>
             <a:endParaRPr lang="en-US"/>
           </a:p>
@@ -4326,7 +4329,7 @@
           <a:p>
             <a:fld id="{7971288B-C322-4259-9C8F-85E2A5B3115C}" type="datetime1">
               <a:rPr lang="en-US" smtClean="0"/>
-              <a:t>2/28/2024</a:t>
+              <a:t>2/29/2024</a:t>
             </a:fld>
             <a:endParaRPr lang="en-US"/>
           </a:p>
@@ -4421,7 +4424,7 @@
           <a:p>
             <a:fld id="{AC26A26C-735B-486D-AB62-52BA64B3E7AD}" type="datetime1">
               <a:rPr lang="en-US" smtClean="0"/>
-              <a:t>2/28/2024</a:t>
+              <a:t>2/29/2024</a:t>
             </a:fld>
             <a:endParaRPr lang="en-US"/>
           </a:p>
@@ -4676,7 +4679,7 @@
           <a:p>
             <a:fld id="{C9FE0ADC-11E5-47EC-B220-DA5C64565F33}" type="datetime1">
               <a:rPr lang="en-US" smtClean="0"/>
-              <a:t>2/28/2024</a:t>
+              <a:t>2/29/2024</a:t>
             </a:fld>
             <a:endParaRPr lang="en-US"/>
           </a:p>
@@ -4939,7 +4942,7 @@
           <a:p>
             <a:fld id="{9371D8C2-0BA4-4709-BFD1-CF363BAE5F7C}" type="datetime1">
               <a:rPr lang="en-US" smtClean="0"/>
-              <a:t>2/28/2024</a:t>
+              <a:t>2/29/2024</a:t>
             </a:fld>
             <a:endParaRPr lang="en-US"/>
           </a:p>
@@ -5682,7 +5685,7 @@
           <a:p>
             <a:fld id="{BFA48C07-0837-44AE-9244-19A11987AC94}" type="datetime1">
               <a:rPr lang="en-US" smtClean="0"/>
-              <a:t>2/28/2024</a:t>
+              <a:t>2/29/2024</a:t>
             </a:fld>
             <a:endParaRPr lang="en-US"/>
           </a:p>
@@ -6302,6 +6305,402 @@
   <p:cSld>
     <p:spTree>
       <p:nvGrpSpPr>
+        <p:cNvPr id="1" name=""/>
+        <p:cNvGrpSpPr/>
+        <p:nvPr/>
+      </p:nvGrpSpPr>
+      <p:grpSpPr>
+        <a:xfrm>
+          <a:off x="0" y="0"/>
+          <a:ext cx="0" cy="0"/>
+          <a:chOff x="0" y="0"/>
+          <a:chExt cx="0" cy="0"/>
+        </a:xfrm>
+      </p:grpSpPr>
+      <p:sp>
+        <p:nvSpPr>
+          <p:cNvPr id="2" name="Title 1">
+            <a:extLst>
+              <a:ext uri="{FF2B5EF4-FFF2-40B4-BE49-F238E27FC236}">
+                <a16:creationId xmlns:a16="http://schemas.microsoft.com/office/drawing/2014/main" id="{FF250D53-AC24-E1CC-A1C3-DE2218262E62}"/>
+              </a:ext>
+            </a:extLst>
+          </p:cNvPr>
+          <p:cNvSpPr>
+            <a:spLocks noGrp="1"/>
+          </p:cNvSpPr>
+          <p:nvPr>
+            <p:ph type="title"/>
+          </p:nvPr>
+        </p:nvSpPr>
+        <p:spPr/>
+        <p:txBody>
+          <a:bodyPr/>
+          <a:lstStyle/>
+          <a:p>
+            <a:r>
+              <a:rPr lang="en-US" dirty="0"/>
+              <a:t>Appendix – Code – Main file</a:t>
+            </a:r>
+          </a:p>
+        </p:txBody>
+      </p:sp>
+      <p:sp>
+        <p:nvSpPr>
+          <p:cNvPr id="3" name="Content Placeholder 2">
+            <a:extLst>
+              <a:ext uri="{FF2B5EF4-FFF2-40B4-BE49-F238E27FC236}">
+                <a16:creationId xmlns:a16="http://schemas.microsoft.com/office/drawing/2014/main" id="{53EA0E5A-8D18-836D-14FA-008F75784715}"/>
+              </a:ext>
+            </a:extLst>
+          </p:cNvPr>
+          <p:cNvSpPr>
+            <a:spLocks noGrp="1"/>
+          </p:cNvSpPr>
+          <p:nvPr>
+            <p:ph idx="1"/>
+          </p:nvPr>
+        </p:nvSpPr>
+        <p:spPr/>
+        <p:txBody>
+          <a:bodyPr/>
+          <a:lstStyle/>
+          <a:p>
+            <a:endParaRPr lang="en-US"/>
+          </a:p>
+        </p:txBody>
+      </p:sp>
+      <p:sp>
+        <p:nvSpPr>
+          <p:cNvPr id="4" name="Slide Number Placeholder 3">
+            <a:extLst>
+              <a:ext uri="{FF2B5EF4-FFF2-40B4-BE49-F238E27FC236}">
+                <a16:creationId xmlns:a16="http://schemas.microsoft.com/office/drawing/2014/main" id="{4BEAEDAB-60F8-9CDF-1300-8B3401975142}"/>
+              </a:ext>
+            </a:extLst>
+          </p:cNvPr>
+          <p:cNvSpPr>
+            <a:spLocks noGrp="1"/>
+          </p:cNvSpPr>
+          <p:nvPr>
+            <p:ph type="sldNum" sz="quarter" idx="12"/>
+          </p:nvPr>
+        </p:nvSpPr>
+        <p:spPr/>
+        <p:txBody>
+          <a:bodyPr/>
+          <a:lstStyle/>
+          <a:p>
+            <a:fld id="{FAE858A7-4E67-4370-B4B5-094CAEAE4D8D}" type="slidenum">
+              <a:rPr lang="en-US" smtClean="0"/>
+              <a:t>10</a:t>
+            </a:fld>
+            <a:endParaRPr lang="en-US"/>
+          </a:p>
+        </p:txBody>
+      </p:sp>
+    </p:spTree>
+    <p:extLst>
+      <p:ext uri="{BB962C8B-B14F-4D97-AF65-F5344CB8AC3E}">
+        <p14:creationId xmlns:p14="http://schemas.microsoft.com/office/powerpoint/2010/main" val="2220207043"/>
+      </p:ext>
+    </p:extLst>
+  </p:cSld>
+  <p:clrMapOvr>
+    <a:masterClrMapping/>
+  </p:clrMapOvr>
+</p:sld>
+</file>
+
+<file path=ppt/slides/slide11.xml><?xml version="1.0" encoding="utf-8"?>
+<p:sld xmlns:a="http://schemas.openxmlformats.org/drawingml/2006/main" xmlns:r="http://schemas.openxmlformats.org/officeDocument/2006/relationships" xmlns:p="http://schemas.openxmlformats.org/presentationml/2006/main">
+  <p:cSld>
+    <p:spTree>
+      <p:nvGrpSpPr>
+        <p:cNvPr id="1" name=""/>
+        <p:cNvGrpSpPr/>
+        <p:nvPr/>
+      </p:nvGrpSpPr>
+      <p:grpSpPr>
+        <a:xfrm>
+          <a:off x="0" y="0"/>
+          <a:ext cx="0" cy="0"/>
+          <a:chOff x="0" y="0"/>
+          <a:chExt cx="0" cy="0"/>
+        </a:xfrm>
+      </p:grpSpPr>
+      <p:sp>
+        <p:nvSpPr>
+          <p:cNvPr id="2" name="Title 1">
+            <a:extLst>
+              <a:ext uri="{FF2B5EF4-FFF2-40B4-BE49-F238E27FC236}">
+                <a16:creationId xmlns:a16="http://schemas.microsoft.com/office/drawing/2014/main" id="{C8FAF836-5DFF-9109-2353-A91E4567E83A}"/>
+              </a:ext>
+            </a:extLst>
+          </p:cNvPr>
+          <p:cNvSpPr>
+            <a:spLocks noGrp="1"/>
+          </p:cNvSpPr>
+          <p:nvPr>
+            <p:ph type="title"/>
+          </p:nvPr>
+        </p:nvSpPr>
+        <p:spPr/>
+        <p:txBody>
+          <a:bodyPr/>
+          <a:lstStyle/>
+          <a:p>
+            <a:r>
+              <a:rPr lang="en-US" dirty="0"/>
+              <a:t>Appendix – Code – Matched Filter</a:t>
+            </a:r>
+          </a:p>
+        </p:txBody>
+      </p:sp>
+      <p:sp>
+        <p:nvSpPr>
+          <p:cNvPr id="3" name="Content Placeholder 2">
+            <a:extLst>
+              <a:ext uri="{FF2B5EF4-FFF2-40B4-BE49-F238E27FC236}">
+                <a16:creationId xmlns:a16="http://schemas.microsoft.com/office/drawing/2014/main" id="{39A623BE-3DE1-5332-C54F-25DE7B1198F7}"/>
+              </a:ext>
+            </a:extLst>
+          </p:cNvPr>
+          <p:cNvSpPr>
+            <a:spLocks noGrp="1"/>
+          </p:cNvSpPr>
+          <p:nvPr>
+            <p:ph idx="1"/>
+          </p:nvPr>
+        </p:nvSpPr>
+        <p:spPr/>
+        <p:txBody>
+          <a:bodyPr/>
+          <a:lstStyle/>
+          <a:p>
+            <a:endParaRPr lang="en-US" dirty="0"/>
+          </a:p>
+        </p:txBody>
+      </p:sp>
+      <p:sp>
+        <p:nvSpPr>
+          <p:cNvPr id="9" name="Slide Number Placeholder 8">
+            <a:extLst>
+              <a:ext uri="{FF2B5EF4-FFF2-40B4-BE49-F238E27FC236}">
+                <a16:creationId xmlns:a16="http://schemas.microsoft.com/office/drawing/2014/main" id="{918AAAAF-023F-100F-1DB8-BD539EEFA733}"/>
+              </a:ext>
+            </a:extLst>
+          </p:cNvPr>
+          <p:cNvSpPr>
+            <a:spLocks noGrp="1"/>
+          </p:cNvSpPr>
+          <p:nvPr>
+            <p:ph type="sldNum" sz="quarter" idx="12"/>
+          </p:nvPr>
+        </p:nvSpPr>
+        <p:spPr/>
+        <p:txBody>
+          <a:bodyPr/>
+          <a:lstStyle/>
+          <a:p>
+            <a:fld id="{FAE858A7-4E67-4370-B4B5-094CAEAE4D8D}" type="slidenum">
+              <a:rPr lang="en-US" smtClean="0"/>
+              <a:t>11</a:t>
+            </a:fld>
+            <a:endParaRPr lang="en-US"/>
+          </a:p>
+        </p:txBody>
+      </p:sp>
+      <p:pic>
+        <p:nvPicPr>
+          <p:cNvPr id="6" name="Picture 5">
+            <a:extLst>
+              <a:ext uri="{FF2B5EF4-FFF2-40B4-BE49-F238E27FC236}">
+                <a16:creationId xmlns:a16="http://schemas.microsoft.com/office/drawing/2014/main" id="{1570C2EC-32CF-8662-4AD0-81914954B7C3}"/>
+              </a:ext>
+            </a:extLst>
+          </p:cNvPr>
+          <p:cNvPicPr>
+            <a:picLocks noChangeAspect="1"/>
+          </p:cNvPicPr>
+          <p:nvPr/>
+        </p:nvPicPr>
+        <p:blipFill>
+          <a:blip r:embed="rId2"/>
+          <a:stretch>
+            <a:fillRect/>
+          </a:stretch>
+        </p:blipFill>
+        <p:spPr>
+          <a:xfrm>
+            <a:off x="677334" y="1270001"/>
+            <a:ext cx="7577665" cy="5136486"/>
+          </a:xfrm>
+          <a:prstGeom prst="rect">
+            <a:avLst/>
+          </a:prstGeom>
+        </p:spPr>
+      </p:pic>
+    </p:spTree>
+    <p:extLst>
+      <p:ext uri="{BB962C8B-B14F-4D97-AF65-F5344CB8AC3E}">
+        <p14:creationId xmlns:p14="http://schemas.microsoft.com/office/powerpoint/2010/main" val="1320312733"/>
+      </p:ext>
+    </p:extLst>
+  </p:cSld>
+  <p:clrMapOvr>
+    <a:masterClrMapping/>
+  </p:clrMapOvr>
+</p:sld>
+</file>
+
+<file path=ppt/slides/slide12.xml><?xml version="1.0" encoding="utf-8"?>
+<p:sld xmlns:a="http://schemas.openxmlformats.org/drawingml/2006/main" xmlns:r="http://schemas.openxmlformats.org/officeDocument/2006/relationships" xmlns:p="http://schemas.openxmlformats.org/presentationml/2006/main">
+  <p:cSld>
+    <p:spTree>
+      <p:nvGrpSpPr>
+        <p:cNvPr id="1" name=""/>
+        <p:cNvGrpSpPr/>
+        <p:nvPr/>
+      </p:nvGrpSpPr>
+      <p:grpSpPr>
+        <a:xfrm>
+          <a:off x="0" y="0"/>
+          <a:ext cx="0" cy="0"/>
+          <a:chOff x="0" y="0"/>
+          <a:chExt cx="0" cy="0"/>
+        </a:xfrm>
+      </p:grpSpPr>
+      <p:sp>
+        <p:nvSpPr>
+          <p:cNvPr id="2" name="Title 1">
+            <a:extLst>
+              <a:ext uri="{FF2B5EF4-FFF2-40B4-BE49-F238E27FC236}">
+                <a16:creationId xmlns:a16="http://schemas.microsoft.com/office/drawing/2014/main" id="{BF9786CC-244C-F2D2-82FF-C5688C76368C}"/>
+              </a:ext>
+            </a:extLst>
+          </p:cNvPr>
+          <p:cNvSpPr>
+            <a:spLocks noGrp="1"/>
+          </p:cNvSpPr>
+          <p:nvPr>
+            <p:ph type="title"/>
+          </p:nvPr>
+        </p:nvSpPr>
+        <p:spPr/>
+        <p:txBody>
+          <a:bodyPr/>
+          <a:lstStyle/>
+          <a:p>
+            <a:r>
+              <a:rPr lang="en-US" dirty="0"/>
+              <a:t>Appendix – Code – Matched Filter</a:t>
+            </a:r>
+          </a:p>
+        </p:txBody>
+      </p:sp>
+      <p:sp>
+        <p:nvSpPr>
+          <p:cNvPr id="3" name="Content Placeholder 2">
+            <a:extLst>
+              <a:ext uri="{FF2B5EF4-FFF2-40B4-BE49-F238E27FC236}">
+                <a16:creationId xmlns:a16="http://schemas.microsoft.com/office/drawing/2014/main" id="{05455F6D-1EC6-8324-5684-A0D09E3F8124}"/>
+              </a:ext>
+            </a:extLst>
+          </p:cNvPr>
+          <p:cNvSpPr>
+            <a:spLocks noGrp="1"/>
+          </p:cNvSpPr>
+          <p:nvPr>
+            <p:ph idx="1"/>
+          </p:nvPr>
+        </p:nvSpPr>
+        <p:spPr/>
+        <p:txBody>
+          <a:bodyPr/>
+          <a:lstStyle/>
+          <a:p>
+            <a:endParaRPr lang="en-US"/>
+          </a:p>
+        </p:txBody>
+      </p:sp>
+      <p:sp>
+        <p:nvSpPr>
+          <p:cNvPr id="4" name="Slide Number Placeholder 3">
+            <a:extLst>
+              <a:ext uri="{FF2B5EF4-FFF2-40B4-BE49-F238E27FC236}">
+                <a16:creationId xmlns:a16="http://schemas.microsoft.com/office/drawing/2014/main" id="{4B26CCBB-E984-6B8A-CCF7-F78040054940}"/>
+              </a:ext>
+            </a:extLst>
+          </p:cNvPr>
+          <p:cNvSpPr>
+            <a:spLocks noGrp="1"/>
+          </p:cNvSpPr>
+          <p:nvPr>
+            <p:ph type="sldNum" sz="quarter" idx="12"/>
+          </p:nvPr>
+        </p:nvSpPr>
+        <p:spPr/>
+        <p:txBody>
+          <a:bodyPr/>
+          <a:lstStyle/>
+          <a:p>
+            <a:fld id="{FAE858A7-4E67-4370-B4B5-094CAEAE4D8D}" type="slidenum">
+              <a:rPr lang="en-US" smtClean="0"/>
+              <a:t>12</a:t>
+            </a:fld>
+            <a:endParaRPr lang="en-US"/>
+          </a:p>
+        </p:txBody>
+      </p:sp>
+      <p:pic>
+        <p:nvPicPr>
+          <p:cNvPr id="6" name="Picture 5">
+            <a:extLst>
+              <a:ext uri="{FF2B5EF4-FFF2-40B4-BE49-F238E27FC236}">
+                <a16:creationId xmlns:a16="http://schemas.microsoft.com/office/drawing/2014/main" id="{3C1E0087-A43E-9149-3ECC-204581980C26}"/>
+              </a:ext>
+            </a:extLst>
+          </p:cNvPr>
+          <p:cNvPicPr>
+            <a:picLocks noChangeAspect="1"/>
+          </p:cNvPicPr>
+          <p:nvPr/>
+        </p:nvPicPr>
+        <p:blipFill>
+          <a:blip r:embed="rId2"/>
+          <a:stretch>
+            <a:fillRect/>
+          </a:stretch>
+        </p:blipFill>
+        <p:spPr>
+          <a:xfrm>
+            <a:off x="677335" y="1298746"/>
+            <a:ext cx="6917114" cy="5115605"/>
+          </a:xfrm>
+          <a:prstGeom prst="rect">
+            <a:avLst/>
+          </a:prstGeom>
+        </p:spPr>
+      </p:pic>
+    </p:spTree>
+    <p:extLst>
+      <p:ext uri="{BB962C8B-B14F-4D97-AF65-F5344CB8AC3E}">
+        <p14:creationId xmlns:p14="http://schemas.microsoft.com/office/powerpoint/2010/main" val="4141323621"/>
+      </p:ext>
+    </p:extLst>
+  </p:cSld>
+  <p:clrMapOvr>
+    <a:masterClrMapping/>
+  </p:clrMapOvr>
+</p:sld>
+</file>
+
+<file path=ppt/slides/slide13.xml><?xml version="1.0" encoding="utf-8"?>
+<p:sld xmlns:a="http://schemas.openxmlformats.org/drawingml/2006/main" xmlns:r="http://schemas.openxmlformats.org/officeDocument/2006/relationships" xmlns:p="http://schemas.openxmlformats.org/presentationml/2006/main">
+  <p:cSld>
+    <p:spTree>
+      <p:nvGrpSpPr>
         <p:cNvPr id="1" name="">
           <a:extLst>
             <a:ext uri="{FF2B5EF4-FFF2-40B4-BE49-F238E27FC236}">
@@ -6396,7 +6795,7 @@
           <a:p>
             <a:fld id="{FAE858A7-4E67-4370-B4B5-094CAEAE4D8D}" type="slidenum">
               <a:rPr lang="en-US" smtClean="0"/>
-              <a:t>10</a:t>
+              <a:t>13</a:t>
             </a:fld>
             <a:endParaRPr lang="en-US"/>
           </a:p>
@@ -6445,7 +6844,7 @@
 </p:sld>
 </file>
 
-<file path=ppt/slides/slide11.xml><?xml version="1.0" encoding="utf-8"?>
+<file path=ppt/slides/slide14.xml><?xml version="1.0" encoding="utf-8"?>
 <p:sld xmlns:a="http://schemas.openxmlformats.org/drawingml/2006/main" xmlns:r="http://schemas.openxmlformats.org/officeDocument/2006/relationships" xmlns:p="http://schemas.openxmlformats.org/presentationml/2006/main">
   <p:cSld>
     <p:spTree>
@@ -6538,7 +6937,7 @@
           <a:p>
             <a:fld id="{FAE858A7-4E67-4370-B4B5-094CAEAE4D8D}" type="slidenum">
               <a:rPr lang="en-US" smtClean="0"/>
-              <a:t>11</a:t>
+              <a:t>14</a:t>
             </a:fld>
             <a:endParaRPr lang="en-US"/>
           </a:p>
@@ -6655,7 +7054,27 @@
           <a:p>
             <a:r>
               <a:rPr lang="en-US" dirty="0"/>
-              <a:t>For this project, </a:t>
+              <a:t>For this project, two retina images were provided and edge detection methods were implemented to find the blood vessels on the images. </a:t>
+            </a:r>
+          </a:p>
+          <a:p>
+            <a:r>
+              <a:rPr lang="en-US" dirty="0"/>
+              <a:t>A comparison of edge detection methods between Canny, Laplace of Gaussian (</a:t>
+            </a:r>
+            <a:r>
+              <a:rPr lang="en-US" dirty="0" err="1"/>
+              <a:t>LoG</a:t>
+            </a:r>
+            <a:r>
+              <a:rPr lang="en-US" dirty="0"/>
+              <a:t>), and Matched filtering with length filtering is shown.</a:t>
+            </a:r>
+          </a:p>
+          <a:p>
+            <a:r>
+              <a:rPr lang="en-US" dirty="0"/>
+              <a:t>A variety of parameters must be tested to find the best edge detection results</a:t>
             </a:r>
           </a:p>
         </p:txBody>
@@ -6770,7 +7189,68 @@
           <a:p>
             <a:r>
               <a:rPr lang="en-US" dirty="0"/>
-              <a:t>Objects</a:t>
+              <a:t>Edge detection is important for finding features and borders in images</a:t>
+            </a:r>
+          </a:p>
+          <a:p>
+            <a:pPr lvl="1"/>
+            <a:r>
+              <a:rPr lang="en-US" dirty="0"/>
+              <a:t>These can range from the retina blood vessels in this project, to animals or other objects</a:t>
+            </a:r>
+          </a:p>
+          <a:p>
+            <a:r>
+              <a:rPr lang="en-US" dirty="0"/>
+              <a:t>The noise effect of an image must be reduced with pre-filtering</a:t>
+            </a:r>
+          </a:p>
+          <a:p>
+            <a:r>
+              <a:rPr lang="en-US" dirty="0"/>
+              <a:t>Canny (1986) established critical criteria in selecting an edge detection filter:</a:t>
+            </a:r>
+          </a:p>
+          <a:p>
+            <a:pPr lvl="1"/>
+            <a:r>
+              <a:rPr lang="en-US" dirty="0"/>
+              <a:t>Signal to Noise Ratio must be high, that is, stronger response to edge than noise</a:t>
+            </a:r>
+          </a:p>
+          <a:p>
+            <a:pPr lvl="1"/>
+            <a:r>
+              <a:rPr lang="en-US" dirty="0"/>
+              <a:t>Edge Localization: The filter response should be strong at x = 0 and not elsewhere</a:t>
+            </a:r>
+          </a:p>
+          <a:p>
+            <a:pPr lvl="1"/>
+            <a:r>
+              <a:rPr lang="en-US" dirty="0"/>
+              <a:t>Low False Positives: There must only be one maximum within the neighborhood</a:t>
+            </a:r>
+          </a:p>
+          <a:p>
+            <a:r>
+              <a:rPr lang="en-US" dirty="0"/>
+              <a:t>From these criteria, three prominent edge detection filters emerged</a:t>
+            </a:r>
+          </a:p>
+          <a:p>
+            <a:pPr lvl="1"/>
+            <a:r>
+              <a:rPr lang="en-US" dirty="0"/>
+              <a:t>Canny, </a:t>
+            </a:r>
+            <a:r>
+              <a:rPr lang="en-US" dirty="0" err="1"/>
+              <a:t>LoG</a:t>
+            </a:r>
+            <a:r>
+              <a:rPr lang="en-US" dirty="0"/>
+              <a:t>, and Matched Filtering</a:t>
             </a:r>
           </a:p>
         </p:txBody>
@@ -6836,10 +7316,10 @@
       </p:grpSpPr>
       <p:sp>
         <p:nvSpPr>
-          <p:cNvPr id="5" name="Title 4">
+          <p:cNvPr id="2" name="Title 1">
             <a:extLst>
               <a:ext uri="{FF2B5EF4-FFF2-40B4-BE49-F238E27FC236}">
-                <a16:creationId xmlns:a16="http://schemas.microsoft.com/office/drawing/2014/main" id="{3B23068E-E031-4C8F-DBC5-0D73D1B2F397}"/>
+                <a16:creationId xmlns:a16="http://schemas.microsoft.com/office/drawing/2014/main" id="{A2A3F2EA-0A0A-063C-D041-8B48FA785149}"/>
               </a:ext>
             </a:extLst>
           </p:cNvPr>
@@ -6850,24 +7330,29 @@
             <p:ph type="title"/>
           </p:nvPr>
         </p:nvSpPr>
-        <p:spPr/>
+        <p:spPr>
+          <a:xfrm>
+            <a:off x="677334" y="609600"/>
+            <a:ext cx="8596668" cy="737360"/>
+          </a:xfrm>
+        </p:spPr>
         <p:txBody>
           <a:bodyPr/>
           <a:lstStyle/>
           <a:p>
             <a:r>
               <a:rPr lang="en-US" dirty="0"/>
-              <a:t>Experimental Results</a:t>
-            </a:r>
-          </a:p>
-        </p:txBody>
-      </p:sp>
-      <p:sp>
-        <p:nvSpPr>
-          <p:cNvPr id="6" name="Text Placeholder 5">
+              <a:t>Technical Background</a:t>
+            </a:r>
+          </a:p>
+        </p:txBody>
+      </p:sp>
+      <p:sp>
+        <p:nvSpPr>
+          <p:cNvPr id="3" name="Content Placeholder 2">
             <a:extLst>
               <a:ext uri="{FF2B5EF4-FFF2-40B4-BE49-F238E27FC236}">
-                <a16:creationId xmlns:a16="http://schemas.microsoft.com/office/drawing/2014/main" id="{4E5D5D9A-052B-E75B-B71E-CE1687B2449E}"/>
+                <a16:creationId xmlns:a16="http://schemas.microsoft.com/office/drawing/2014/main" id="{90D6A6C5-B556-D473-8165-F1CC8C778180}"/>
               </a:ext>
             </a:extLst>
           </p:cNvPr>
@@ -6875,15 +7360,92 @@
             <a:spLocks noGrp="1"/>
           </p:cNvSpPr>
           <p:nvPr>
-            <p:ph type="body" idx="1"/>
-          </p:nvPr>
-        </p:nvSpPr>
-        <p:spPr/>
-        <p:txBody>
-          <a:bodyPr/>
-          <a:lstStyle/>
-          <a:p>
-            <a:endParaRPr lang="en-US"/>
+            <p:ph sz="half" idx="1"/>
+          </p:nvPr>
+        </p:nvSpPr>
+        <p:spPr>
+          <a:xfrm>
+            <a:off x="677334" y="1489322"/>
+            <a:ext cx="4184035" cy="4552039"/>
+          </a:xfrm>
+        </p:spPr>
+        <p:txBody>
+          <a:bodyPr/>
+          <a:lstStyle/>
+          <a:p>
+            <a:r>
+              <a:rPr lang="en-US" dirty="0"/>
+              <a:t>The Laplace of Gaussian (</a:t>
+            </a:r>
+            <a:r>
+              <a:rPr lang="en-US" dirty="0" err="1"/>
+              <a:t>LoG</a:t>
+            </a:r>
+            <a:r>
+              <a:rPr lang="en-US" dirty="0"/>
+              <a:t>) is a Laplace function with a Gaussian pre-filter, shown below. </a:t>
+            </a:r>
+          </a:p>
+        </p:txBody>
+      </p:sp>
+      <p:sp>
+        <p:nvSpPr>
+          <p:cNvPr id="5" name="Content Placeholder 4">
+            <a:extLst>
+              <a:ext uri="{FF2B5EF4-FFF2-40B4-BE49-F238E27FC236}">
+                <a16:creationId xmlns:a16="http://schemas.microsoft.com/office/drawing/2014/main" id="{64BE4543-099F-5BE2-5B8C-7BDC1F3EAFEF}"/>
+              </a:ext>
+            </a:extLst>
+          </p:cNvPr>
+          <p:cNvSpPr>
+            <a:spLocks noGrp="1"/>
+          </p:cNvSpPr>
+          <p:nvPr>
+            <p:ph sz="half" idx="2"/>
+          </p:nvPr>
+        </p:nvSpPr>
+        <p:spPr>
+          <a:xfrm>
+            <a:off x="5089970" y="1489323"/>
+            <a:ext cx="4184034" cy="4552040"/>
+          </a:xfrm>
+        </p:spPr>
+        <p:txBody>
+          <a:bodyPr/>
+          <a:lstStyle/>
+          <a:p>
+            <a:r>
+              <a:rPr lang="en-US" dirty="0"/>
+              <a:t>The Canny method utilizes the gradient of two first order derivatives corresponding to the rows and columns of an image.</a:t>
+            </a:r>
+          </a:p>
+          <a:p>
+            <a:pPr lvl="1"/>
+            <a:r>
+              <a:rPr lang="en-US" dirty="0"/>
+              <a:t>Compute the first order derivatives of the rows and columns</a:t>
+            </a:r>
+          </a:p>
+          <a:p>
+            <a:pPr lvl="1"/>
+            <a:r>
+              <a:rPr lang="en-US" dirty="0"/>
+              <a:t>Compute the magnitude and direction of the gradient</a:t>
+            </a:r>
+          </a:p>
+          <a:p>
+            <a:pPr lvl="1"/>
+            <a:r>
+              <a:rPr lang="en-US" dirty="0"/>
+              <a:t>Apply non-maximum suppression to the gradient magnitude, finding maximum along the gradient direction</a:t>
+            </a:r>
+          </a:p>
+          <a:p>
+            <a:pPr lvl="1"/>
+            <a:r>
+              <a:rPr lang="en-US" dirty="0"/>
+              <a:t>Weak edges can be linked after implementing a connectivity analysis.</a:t>
+            </a:r>
           </a:p>
         </p:txBody>
       </p:sp>
@@ -6892,7 +7454,7 @@
           <p:cNvPr id="4" name="Slide Number Placeholder 3">
             <a:extLst>
               <a:ext uri="{FF2B5EF4-FFF2-40B4-BE49-F238E27FC236}">
-                <a16:creationId xmlns:a16="http://schemas.microsoft.com/office/drawing/2014/main" id="{65DF77CB-B6D2-23C7-56CC-1E43467B98A4}"/>
+                <a16:creationId xmlns:a16="http://schemas.microsoft.com/office/drawing/2014/main" id="{3C600063-1688-5A78-3605-819237FAAC5B}"/>
               </a:ext>
             </a:extLst>
           </p:cNvPr>
@@ -6916,10 +7478,70 @@
           </a:p>
         </p:txBody>
       </p:sp>
+      <p:pic>
+        <p:nvPicPr>
+          <p:cNvPr id="7" name="Picture 6">
+            <a:extLst>
+              <a:ext uri="{FF2B5EF4-FFF2-40B4-BE49-F238E27FC236}">
+                <a16:creationId xmlns:a16="http://schemas.microsoft.com/office/drawing/2014/main" id="{38D5AD05-663E-8069-5D57-400745E8CDF6}"/>
+              </a:ext>
+            </a:extLst>
+          </p:cNvPr>
+          <p:cNvPicPr>
+            <a:picLocks noChangeAspect="1"/>
+          </p:cNvPicPr>
+          <p:nvPr/>
+        </p:nvPicPr>
+        <p:blipFill>
+          <a:blip r:embed="rId2"/>
+          <a:stretch>
+            <a:fillRect/>
+          </a:stretch>
+        </p:blipFill>
+        <p:spPr>
+          <a:xfrm>
+            <a:off x="807243" y="3180819"/>
+            <a:ext cx="3924215" cy="2909996"/>
+          </a:xfrm>
+          <a:prstGeom prst="rect">
+            <a:avLst/>
+          </a:prstGeom>
+        </p:spPr>
+      </p:pic>
+      <p:pic>
+        <p:nvPicPr>
+          <p:cNvPr id="9" name="Picture 8">
+            <a:extLst>
+              <a:ext uri="{FF2B5EF4-FFF2-40B4-BE49-F238E27FC236}">
+                <a16:creationId xmlns:a16="http://schemas.microsoft.com/office/drawing/2014/main" id="{4A2BEFD2-9BAA-45D2-29B7-2D76FECF6BDB}"/>
+              </a:ext>
+            </a:extLst>
+          </p:cNvPr>
+          <p:cNvPicPr>
+            <a:picLocks noChangeAspect="1"/>
+          </p:cNvPicPr>
+          <p:nvPr/>
+        </p:nvPicPr>
+        <p:blipFill>
+          <a:blip r:embed="rId3"/>
+          <a:stretch>
+            <a:fillRect/>
+          </a:stretch>
+        </p:blipFill>
+        <p:spPr>
+          <a:xfrm>
+            <a:off x="1090861" y="2520659"/>
+            <a:ext cx="3356980" cy="660160"/>
+          </a:xfrm>
+          <a:prstGeom prst="rect">
+            <a:avLst/>
+          </a:prstGeom>
+        </p:spPr>
+      </p:pic>
     </p:spTree>
     <p:extLst>
       <p:ext uri="{BB962C8B-B14F-4D97-AF65-F5344CB8AC3E}">
-        <p14:creationId xmlns:p14="http://schemas.microsoft.com/office/powerpoint/2010/main" val="22044305"/>
+        <p14:creationId xmlns:p14="http://schemas.microsoft.com/office/powerpoint/2010/main" val="171634006"/>
       </p:ext>
     </p:extLst>
   </p:cSld>
@@ -6948,10 +7570,10 @@
       </p:grpSpPr>
       <p:sp>
         <p:nvSpPr>
-          <p:cNvPr id="5" name="Title 4">
+          <p:cNvPr id="2" name="Title 1">
             <a:extLst>
               <a:ext uri="{FF2B5EF4-FFF2-40B4-BE49-F238E27FC236}">
-                <a16:creationId xmlns:a16="http://schemas.microsoft.com/office/drawing/2014/main" id="{EBADF2D4-425F-3432-62B6-AB5DAC67848A}"/>
+                <a16:creationId xmlns:a16="http://schemas.microsoft.com/office/drawing/2014/main" id="{19CDC669-D07C-C204-FF50-782B04052F35}"/>
               </a:ext>
             </a:extLst>
           </p:cNvPr>
@@ -6969,17 +7591,17 @@
           <a:p>
             <a:r>
               <a:rPr lang="en-US" dirty="0"/>
-              <a:t>Retina 1</a:t>
-            </a:r>
-          </a:p>
-        </p:txBody>
-      </p:sp>
-      <p:sp>
-        <p:nvSpPr>
-          <p:cNvPr id="6" name="Content Placeholder 5">
+              <a:t>Technical Background – Canny continued</a:t>
+            </a:r>
+          </a:p>
+        </p:txBody>
+      </p:sp>
+      <p:sp>
+        <p:nvSpPr>
+          <p:cNvPr id="6" name="Text Placeholder 5">
             <a:extLst>
               <a:ext uri="{FF2B5EF4-FFF2-40B4-BE49-F238E27FC236}">
-                <a16:creationId xmlns:a16="http://schemas.microsoft.com/office/drawing/2014/main" id="{06199DE9-861C-D872-01E9-0A035087C226}"/>
+                <a16:creationId xmlns:a16="http://schemas.microsoft.com/office/drawing/2014/main" id="{FA73E01C-2803-0146-08CB-9C8D575AD4C4}"/>
               </a:ext>
             </a:extLst>
           </p:cNvPr>
@@ -6987,35 +7609,153 @@
             <a:spLocks noGrp="1"/>
           </p:cNvSpPr>
           <p:nvPr>
-            <p:ph idx="1"/>
-          </p:nvPr>
-        </p:nvSpPr>
-        <p:spPr/>
+            <p:ph type="body" idx="1"/>
+          </p:nvPr>
+        </p:nvSpPr>
+        <p:spPr>
+          <a:xfrm>
+            <a:off x="675745" y="1354138"/>
+            <a:ext cx="4185623" cy="576262"/>
+          </a:xfrm>
+        </p:spPr>
         <p:txBody>
           <a:bodyPr/>
           <a:lstStyle/>
           <a:p>
             <a:r>
               <a:rPr lang="en-US" dirty="0"/>
-              <a:t>Sigma = 1; </a:t>
-            </a:r>
-            <a:r>
-              <a:rPr lang="en-US" dirty="0" err="1"/>
-              <a:t>filtersize</a:t>
-            </a:r>
-            <a:r>
-              <a:rPr lang="en-US" dirty="0"/>
-              <a:t> = </a:t>
-            </a:r>
-          </a:p>
-        </p:txBody>
-      </p:sp>
-      <p:sp>
-        <p:nvSpPr>
-          <p:cNvPr id="4" name="Slide Number Placeholder 3">
+              <a:t>Relevant equations</a:t>
+            </a:r>
+          </a:p>
+        </p:txBody>
+      </p:sp>
+      <p:sp>
+        <p:nvSpPr>
+          <p:cNvPr id="7" name="Content Placeholder 6">
             <a:extLst>
               <a:ext uri="{FF2B5EF4-FFF2-40B4-BE49-F238E27FC236}">
-                <a16:creationId xmlns:a16="http://schemas.microsoft.com/office/drawing/2014/main" id="{76199A3C-4F35-3BD1-F235-DFC4C9391C8A}"/>
+                <a16:creationId xmlns:a16="http://schemas.microsoft.com/office/drawing/2014/main" id="{E7EB846C-FD97-6574-0222-7AFCCBDF06E5}"/>
+              </a:ext>
+            </a:extLst>
+          </p:cNvPr>
+          <p:cNvSpPr>
+            <a:spLocks noGrp="1"/>
+          </p:cNvSpPr>
+          <p:nvPr>
+            <p:ph sz="half" idx="2"/>
+          </p:nvPr>
+        </p:nvSpPr>
+        <p:spPr>
+          <a:xfrm>
+            <a:off x="675745" y="1930401"/>
+            <a:ext cx="4185623" cy="4110962"/>
+          </a:xfrm>
+        </p:spPr>
+        <p:txBody>
+          <a:bodyPr/>
+          <a:lstStyle/>
+          <a:p>
+            <a:r>
+              <a:rPr lang="en-US" dirty="0"/>
+              <a:t>M(</a:t>
+            </a:r>
+            <a:r>
+              <a:rPr lang="en-US" dirty="0" err="1"/>
+              <a:t>x,y</a:t>
+            </a:r>
+            <a:r>
+              <a:rPr lang="en-US" dirty="0"/>
+              <a:t>) and </a:t>
+            </a:r>
+            <a:r>
+              <a:rPr lang="el-GR" dirty="0"/>
+              <a:t>α</a:t>
+            </a:r>
+            <a:r>
+              <a:rPr lang="en-US" dirty="0"/>
+              <a:t>(</a:t>
+            </a:r>
+            <a:r>
+              <a:rPr lang="en-US" dirty="0" err="1"/>
+              <a:t>x,y</a:t>
+            </a:r>
+            <a:r>
+              <a:rPr lang="en-US" dirty="0"/>
+              <a:t>) represent the magnitude and direction of the gradient respectively. </a:t>
+            </a:r>
+          </a:p>
+        </p:txBody>
+      </p:sp>
+      <p:sp>
+        <p:nvSpPr>
+          <p:cNvPr id="8" name="Text Placeholder 7">
+            <a:extLst>
+              <a:ext uri="{FF2B5EF4-FFF2-40B4-BE49-F238E27FC236}">
+                <a16:creationId xmlns:a16="http://schemas.microsoft.com/office/drawing/2014/main" id="{F3AAEFE0-B78E-EDE9-7502-724046CFA26C}"/>
+              </a:ext>
+            </a:extLst>
+          </p:cNvPr>
+          <p:cNvSpPr>
+            <a:spLocks noGrp="1"/>
+          </p:cNvSpPr>
+          <p:nvPr>
+            <p:ph type="body" sz="quarter" idx="3"/>
+          </p:nvPr>
+        </p:nvSpPr>
+        <p:spPr>
+          <a:xfrm>
+            <a:off x="5088383" y="1354138"/>
+            <a:ext cx="4185618" cy="576262"/>
+          </a:xfrm>
+        </p:spPr>
+        <p:txBody>
+          <a:bodyPr/>
+          <a:lstStyle/>
+          <a:p>
+            <a:pPr algn="ctr"/>
+            <a:r>
+              <a:rPr lang="en-US" dirty="0"/>
+              <a:t>Canny Gradient</a:t>
+            </a:r>
+          </a:p>
+        </p:txBody>
+      </p:sp>
+      <p:sp>
+        <p:nvSpPr>
+          <p:cNvPr id="9" name="Content Placeholder 8">
+            <a:extLst>
+              <a:ext uri="{FF2B5EF4-FFF2-40B4-BE49-F238E27FC236}">
+                <a16:creationId xmlns:a16="http://schemas.microsoft.com/office/drawing/2014/main" id="{5371B9B0-3AD2-5902-45D5-1BA2CC8B3EBD}"/>
+              </a:ext>
+            </a:extLst>
+          </p:cNvPr>
+          <p:cNvSpPr>
+            <a:spLocks noGrp="1"/>
+          </p:cNvSpPr>
+          <p:nvPr>
+            <p:ph sz="quarter" idx="4"/>
+          </p:nvPr>
+        </p:nvSpPr>
+        <p:spPr>
+          <a:xfrm>
+            <a:off x="5088384" y="1930401"/>
+            <a:ext cx="4185617" cy="4110962"/>
+          </a:xfrm>
+        </p:spPr>
+        <p:txBody>
+          <a:bodyPr/>
+          <a:lstStyle/>
+          <a:p>
+            <a:endParaRPr lang="en-US"/>
+          </a:p>
+        </p:txBody>
+      </p:sp>
+      <p:sp>
+        <p:nvSpPr>
+          <p:cNvPr id="5" name="Slide Number Placeholder 4">
+            <a:extLst>
+              <a:ext uri="{FF2B5EF4-FFF2-40B4-BE49-F238E27FC236}">
+                <a16:creationId xmlns:a16="http://schemas.microsoft.com/office/drawing/2014/main" id="{4C2951E0-F85F-F8D9-C18F-9DD2C0906899}"/>
               </a:ext>
             </a:extLst>
           </p:cNvPr>
@@ -7039,10 +7779,70 @@
           </a:p>
         </p:txBody>
       </p:sp>
+      <p:pic>
+        <p:nvPicPr>
+          <p:cNvPr id="11" name="Picture 10">
+            <a:extLst>
+              <a:ext uri="{FF2B5EF4-FFF2-40B4-BE49-F238E27FC236}">
+                <a16:creationId xmlns:a16="http://schemas.microsoft.com/office/drawing/2014/main" id="{5B0A9844-3443-5CF6-1619-8676555219D4}"/>
+              </a:ext>
+            </a:extLst>
+          </p:cNvPr>
+          <p:cNvPicPr>
+            <a:picLocks noChangeAspect="1"/>
+          </p:cNvPicPr>
+          <p:nvPr/>
+        </p:nvPicPr>
+        <p:blipFill>
+          <a:blip r:embed="rId2"/>
+          <a:stretch>
+            <a:fillRect/>
+          </a:stretch>
+        </p:blipFill>
+        <p:spPr>
+          <a:xfrm>
+            <a:off x="5088382" y="1930400"/>
+            <a:ext cx="6229396" cy="4314857"/>
+          </a:xfrm>
+          <a:prstGeom prst="rect">
+            <a:avLst/>
+          </a:prstGeom>
+        </p:spPr>
+      </p:pic>
+      <p:pic>
+        <p:nvPicPr>
+          <p:cNvPr id="12" name="Picture 11">
+            <a:extLst>
+              <a:ext uri="{FF2B5EF4-FFF2-40B4-BE49-F238E27FC236}">
+                <a16:creationId xmlns:a16="http://schemas.microsoft.com/office/drawing/2014/main" id="{D28A751D-20FE-4522-C1F4-73F4085AA85F}"/>
+              </a:ext>
+            </a:extLst>
+          </p:cNvPr>
+          <p:cNvPicPr>
+            <a:picLocks noChangeAspect="1"/>
+          </p:cNvPicPr>
+          <p:nvPr/>
+        </p:nvPicPr>
+        <p:blipFill>
+          <a:blip r:embed="rId3"/>
+          <a:stretch>
+            <a:fillRect/>
+          </a:stretch>
+        </p:blipFill>
+        <p:spPr>
+          <a:xfrm>
+            <a:off x="956597" y="3267297"/>
+            <a:ext cx="3623918" cy="3139190"/>
+          </a:xfrm>
+          <a:prstGeom prst="rect">
+            <a:avLst/>
+          </a:prstGeom>
+        </p:spPr>
+      </p:pic>
     </p:spTree>
     <p:extLst>
       <p:ext uri="{BB962C8B-B14F-4D97-AF65-F5344CB8AC3E}">
-        <p14:creationId xmlns:p14="http://schemas.microsoft.com/office/powerpoint/2010/main" val="1516397924"/>
+        <p14:creationId xmlns:p14="http://schemas.microsoft.com/office/powerpoint/2010/main" val="2537047989"/>
       </p:ext>
     </p:extLst>
   </p:cSld>
@@ -7071,10 +7871,10 @@
       </p:grpSpPr>
       <p:sp>
         <p:nvSpPr>
-          <p:cNvPr id="2" name="Title 1">
+          <p:cNvPr id="8" name="Title 7">
             <a:extLst>
               <a:ext uri="{FF2B5EF4-FFF2-40B4-BE49-F238E27FC236}">
-                <a16:creationId xmlns:a16="http://schemas.microsoft.com/office/drawing/2014/main" id="{0978BC7C-0632-C147-305A-60B340730BF9}"/>
+                <a16:creationId xmlns:a16="http://schemas.microsoft.com/office/drawing/2014/main" id="{0A703E8F-B0F0-8AF3-146D-B3E1221AB2CD}"/>
               </a:ext>
             </a:extLst>
           </p:cNvPr>
@@ -7085,24 +7885,29 @@
             <p:ph type="title"/>
           </p:nvPr>
         </p:nvSpPr>
-        <p:spPr/>
+        <p:spPr>
+          <a:xfrm>
+            <a:off x="677334" y="609600"/>
+            <a:ext cx="8596668" cy="956378"/>
+          </a:xfrm>
+        </p:spPr>
         <p:txBody>
           <a:bodyPr/>
           <a:lstStyle/>
           <a:p>
             <a:r>
               <a:rPr lang="en-US" dirty="0"/>
-              <a:t>Discussion and Conclusion</a:t>
-            </a:r>
-          </a:p>
-        </p:txBody>
-      </p:sp>
-      <p:sp>
-        <p:nvSpPr>
-          <p:cNvPr id="3" name="Content Placeholder 2">
+              <a:t>Technical Background – Matched Filter</a:t>
+            </a:r>
+          </a:p>
+        </p:txBody>
+      </p:sp>
+      <p:sp>
+        <p:nvSpPr>
+          <p:cNvPr id="9" name="Content Placeholder 8">
             <a:extLst>
               <a:ext uri="{FF2B5EF4-FFF2-40B4-BE49-F238E27FC236}">
-                <a16:creationId xmlns:a16="http://schemas.microsoft.com/office/drawing/2014/main" id="{66552094-2F2A-1B32-4380-C417359657E2}"/>
+                <a16:creationId xmlns:a16="http://schemas.microsoft.com/office/drawing/2014/main" id="{92CFAE9C-049C-E3FB-216E-BF27E4391911}"/>
               </a:ext>
             </a:extLst>
           </p:cNvPr>
@@ -7113,24 +7918,47 @@
             <p:ph idx="1"/>
           </p:nvPr>
         </p:nvSpPr>
-        <p:spPr/>
+        <p:spPr>
+          <a:xfrm>
+            <a:off x="677334" y="1565979"/>
+            <a:ext cx="8596668" cy="4475384"/>
+          </a:xfrm>
+        </p:spPr>
         <p:txBody>
           <a:bodyPr/>
           <a:lstStyle/>
           <a:p>
             <a:r>
               <a:rPr lang="en-US" dirty="0"/>
-              <a:t>I </a:t>
-            </a:r>
-          </a:p>
-        </p:txBody>
-      </p:sp>
-      <p:sp>
-        <p:nvSpPr>
-          <p:cNvPr id="5" name="Slide Number Placeholder 4">
+              <a:t>The matched filter implements a gaussian filter along one direction, rotating it, then applying the rotated filter. This is repeated until a bank of filtered images is completed. </a:t>
+            </a:r>
+          </a:p>
+          <a:p>
+            <a:r>
+              <a:rPr lang="en-US" dirty="0"/>
+              <a:t>The filtered image bank is then checked pixel by pixel to find the strongest response to filtering with a new image formed from these responses. </a:t>
+            </a:r>
+          </a:p>
+          <a:p>
+            <a:r>
+              <a:rPr lang="en-US" dirty="0"/>
+              <a:t>After a threshold is chosen, pixel gray values below the threshold are set to 0 (black) and above are set to 1 (white). </a:t>
+            </a:r>
+          </a:p>
+          <a:p>
+            <a:r>
+              <a:rPr lang="en-US" dirty="0"/>
+              <a:t>Lastly, to eliminate small, weak edges, a length filtering technique is applied to the image.</a:t>
+            </a:r>
+          </a:p>
+        </p:txBody>
+      </p:sp>
+      <p:sp>
+        <p:nvSpPr>
+          <p:cNvPr id="7" name="Slide Number Placeholder 6">
             <a:extLst>
               <a:ext uri="{FF2B5EF4-FFF2-40B4-BE49-F238E27FC236}">
-                <a16:creationId xmlns:a16="http://schemas.microsoft.com/office/drawing/2014/main" id="{C395C6EC-FE0F-0BC0-D4C5-51E09090E166}"/>
+                <a16:creationId xmlns:a16="http://schemas.microsoft.com/office/drawing/2014/main" id="{0B3BE8CA-F2C0-FDB6-5BCC-9834468ED62E}"/>
               </a:ext>
             </a:extLst>
           </p:cNvPr>
@@ -7157,7 +7985,7 @@
     </p:spTree>
     <p:extLst>
       <p:ext uri="{BB962C8B-B14F-4D97-AF65-F5344CB8AC3E}">
-        <p14:creationId xmlns:p14="http://schemas.microsoft.com/office/powerpoint/2010/main" val="1321214935"/>
+        <p14:creationId xmlns:p14="http://schemas.microsoft.com/office/powerpoint/2010/main" val="713067379"/>
       </p:ext>
     </p:extLst>
   </p:cSld>
@@ -7186,10 +8014,10 @@
       </p:grpSpPr>
       <p:sp>
         <p:nvSpPr>
-          <p:cNvPr id="2" name="Title 1">
+          <p:cNvPr id="5" name="Title 4">
             <a:extLst>
               <a:ext uri="{FF2B5EF4-FFF2-40B4-BE49-F238E27FC236}">
-                <a16:creationId xmlns:a16="http://schemas.microsoft.com/office/drawing/2014/main" id="{FF250D53-AC24-E1CC-A1C3-DE2218262E62}"/>
+                <a16:creationId xmlns:a16="http://schemas.microsoft.com/office/drawing/2014/main" id="{3B23068E-E031-4C8F-DBC5-0D73D1B2F397}"/>
               </a:ext>
             </a:extLst>
           </p:cNvPr>
@@ -7207,17 +8035,17 @@
           <a:p>
             <a:r>
               <a:rPr lang="en-US" dirty="0"/>
-              <a:t>Appendix – Code – Main file</a:t>
-            </a:r>
-          </a:p>
-        </p:txBody>
-      </p:sp>
-      <p:sp>
-        <p:nvSpPr>
-          <p:cNvPr id="3" name="Content Placeholder 2">
+              <a:t>Experimental Results</a:t>
+            </a:r>
+          </a:p>
+        </p:txBody>
+      </p:sp>
+      <p:sp>
+        <p:nvSpPr>
+          <p:cNvPr id="6" name="Text Placeholder 5">
             <a:extLst>
               <a:ext uri="{FF2B5EF4-FFF2-40B4-BE49-F238E27FC236}">
-                <a16:creationId xmlns:a16="http://schemas.microsoft.com/office/drawing/2014/main" id="{53EA0E5A-8D18-836D-14FA-008F75784715}"/>
+                <a16:creationId xmlns:a16="http://schemas.microsoft.com/office/drawing/2014/main" id="{4E5D5D9A-052B-E75B-B71E-CE1687B2449E}"/>
               </a:ext>
             </a:extLst>
           </p:cNvPr>
@@ -7225,7 +8053,7 @@
             <a:spLocks noGrp="1"/>
           </p:cNvSpPr>
           <p:nvPr>
-            <p:ph idx="1"/>
+            <p:ph type="body" idx="1"/>
           </p:nvPr>
         </p:nvSpPr>
         <p:spPr/>
@@ -7242,7 +8070,7 @@
           <p:cNvPr id="4" name="Slide Number Placeholder 3">
             <a:extLst>
               <a:ext uri="{FF2B5EF4-FFF2-40B4-BE49-F238E27FC236}">
-                <a16:creationId xmlns:a16="http://schemas.microsoft.com/office/drawing/2014/main" id="{4BEAEDAB-60F8-9CDF-1300-8B3401975142}"/>
+                <a16:creationId xmlns:a16="http://schemas.microsoft.com/office/drawing/2014/main" id="{65DF77CB-B6D2-23C7-56CC-1E43467B98A4}"/>
               </a:ext>
             </a:extLst>
           </p:cNvPr>
@@ -7269,7 +8097,7 @@
     </p:spTree>
     <p:extLst>
       <p:ext uri="{BB962C8B-B14F-4D97-AF65-F5344CB8AC3E}">
-        <p14:creationId xmlns:p14="http://schemas.microsoft.com/office/powerpoint/2010/main" val="2220207043"/>
+        <p14:creationId xmlns:p14="http://schemas.microsoft.com/office/powerpoint/2010/main" val="22044305"/>
       </p:ext>
     </p:extLst>
   </p:cSld>
@@ -7298,10 +8126,10 @@
       </p:grpSpPr>
       <p:sp>
         <p:nvSpPr>
-          <p:cNvPr id="2" name="Title 1">
+          <p:cNvPr id="5" name="Title 4">
             <a:extLst>
               <a:ext uri="{FF2B5EF4-FFF2-40B4-BE49-F238E27FC236}">
-                <a16:creationId xmlns:a16="http://schemas.microsoft.com/office/drawing/2014/main" id="{C8FAF836-5DFF-9109-2353-A91E4567E83A}"/>
+                <a16:creationId xmlns:a16="http://schemas.microsoft.com/office/drawing/2014/main" id="{EBADF2D4-425F-3432-62B6-AB5DAC67848A}"/>
               </a:ext>
             </a:extLst>
           </p:cNvPr>
@@ -7319,17 +8147,17 @@
           <a:p>
             <a:r>
               <a:rPr lang="en-US" dirty="0"/>
-              <a:t>Appendix – Code – Matched Filter</a:t>
-            </a:r>
-          </a:p>
-        </p:txBody>
-      </p:sp>
-      <p:sp>
-        <p:nvSpPr>
-          <p:cNvPr id="3" name="Content Placeholder 2">
+              <a:t>Retina 1</a:t>
+            </a:r>
+          </a:p>
+        </p:txBody>
+      </p:sp>
+      <p:sp>
+        <p:nvSpPr>
+          <p:cNvPr id="6" name="Content Placeholder 5">
             <a:extLst>
               <a:ext uri="{FF2B5EF4-FFF2-40B4-BE49-F238E27FC236}">
-                <a16:creationId xmlns:a16="http://schemas.microsoft.com/office/drawing/2014/main" id="{39A623BE-3DE1-5332-C54F-25DE7B1198F7}"/>
+                <a16:creationId xmlns:a16="http://schemas.microsoft.com/office/drawing/2014/main" id="{06199DE9-861C-D872-01E9-0A035087C226}"/>
               </a:ext>
             </a:extLst>
           </p:cNvPr>
@@ -7345,16 +8173,19 @@
           <a:bodyPr/>
           <a:lstStyle/>
           <a:p>
-            <a:endParaRPr lang="en-US" dirty="0"/>
-          </a:p>
-        </p:txBody>
-      </p:sp>
-      <p:sp>
-        <p:nvSpPr>
-          <p:cNvPr id="9" name="Slide Number Placeholder 8">
+            <a:r>
+              <a:rPr lang="en-US" dirty="0"/>
+              <a:t> </a:t>
+            </a:r>
+          </a:p>
+        </p:txBody>
+      </p:sp>
+      <p:sp>
+        <p:nvSpPr>
+          <p:cNvPr id="4" name="Slide Number Placeholder 3">
             <a:extLst>
               <a:ext uri="{FF2B5EF4-FFF2-40B4-BE49-F238E27FC236}">
-                <a16:creationId xmlns:a16="http://schemas.microsoft.com/office/drawing/2014/main" id="{918AAAAF-023F-100F-1DB8-BD539EEFA733}"/>
+                <a16:creationId xmlns:a16="http://schemas.microsoft.com/office/drawing/2014/main" id="{76199A3C-4F35-3BD1-F235-DFC4C9391C8A}"/>
               </a:ext>
             </a:extLst>
           </p:cNvPr>
@@ -7378,40 +8209,10 @@
           </a:p>
         </p:txBody>
       </p:sp>
-      <p:pic>
-        <p:nvPicPr>
-          <p:cNvPr id="6" name="Picture 5">
-            <a:extLst>
-              <a:ext uri="{FF2B5EF4-FFF2-40B4-BE49-F238E27FC236}">
-                <a16:creationId xmlns:a16="http://schemas.microsoft.com/office/drawing/2014/main" id="{1570C2EC-32CF-8662-4AD0-81914954B7C3}"/>
-              </a:ext>
-            </a:extLst>
-          </p:cNvPr>
-          <p:cNvPicPr>
-            <a:picLocks noChangeAspect="1"/>
-          </p:cNvPicPr>
-          <p:nvPr/>
-        </p:nvPicPr>
-        <p:blipFill>
-          <a:blip r:embed="rId2"/>
-          <a:stretch>
-            <a:fillRect/>
-          </a:stretch>
-        </p:blipFill>
-        <p:spPr>
-          <a:xfrm>
-            <a:off x="677334" y="1270001"/>
-            <a:ext cx="7577665" cy="5136486"/>
-          </a:xfrm>
-          <a:prstGeom prst="rect">
-            <a:avLst/>
-          </a:prstGeom>
-        </p:spPr>
-      </p:pic>
     </p:spTree>
     <p:extLst>
       <p:ext uri="{BB962C8B-B14F-4D97-AF65-F5344CB8AC3E}">
-        <p14:creationId xmlns:p14="http://schemas.microsoft.com/office/powerpoint/2010/main" val="1320312733"/>
+        <p14:creationId xmlns:p14="http://schemas.microsoft.com/office/powerpoint/2010/main" val="1516397924"/>
       </p:ext>
     </p:extLst>
   </p:cSld>
@@ -7443,7 +8244,7 @@
           <p:cNvPr id="2" name="Title 1">
             <a:extLst>
               <a:ext uri="{FF2B5EF4-FFF2-40B4-BE49-F238E27FC236}">
-                <a16:creationId xmlns:a16="http://schemas.microsoft.com/office/drawing/2014/main" id="{BF9786CC-244C-F2D2-82FF-C5688C76368C}"/>
+                <a16:creationId xmlns:a16="http://schemas.microsoft.com/office/drawing/2014/main" id="{0978BC7C-0632-C147-305A-60B340730BF9}"/>
               </a:ext>
             </a:extLst>
           </p:cNvPr>
@@ -7461,7 +8262,7 @@
           <a:p>
             <a:r>
               <a:rPr lang="en-US" dirty="0"/>
-              <a:t>Appendix – Code – Matched Filter</a:t>
+              <a:t>Discussion and Conclusion</a:t>
             </a:r>
           </a:p>
         </p:txBody>
@@ -7471,7 +8272,7 @@
           <p:cNvPr id="3" name="Content Placeholder 2">
             <a:extLst>
               <a:ext uri="{FF2B5EF4-FFF2-40B4-BE49-F238E27FC236}">
-                <a16:creationId xmlns:a16="http://schemas.microsoft.com/office/drawing/2014/main" id="{05455F6D-1EC6-8324-5684-A0D09E3F8124}"/>
+                <a16:creationId xmlns:a16="http://schemas.microsoft.com/office/drawing/2014/main" id="{66552094-2F2A-1B32-4380-C417359657E2}"/>
               </a:ext>
             </a:extLst>
           </p:cNvPr>
@@ -7487,16 +8288,19 @@
           <a:bodyPr/>
           <a:lstStyle/>
           <a:p>
-            <a:endParaRPr lang="en-US"/>
-          </a:p>
-        </p:txBody>
-      </p:sp>
-      <p:sp>
-        <p:nvSpPr>
-          <p:cNvPr id="4" name="Slide Number Placeholder 3">
+            <a:r>
+              <a:rPr lang="en-US" dirty="0"/>
+              <a:t>I </a:t>
+            </a:r>
+          </a:p>
+        </p:txBody>
+      </p:sp>
+      <p:sp>
+        <p:nvSpPr>
+          <p:cNvPr id="5" name="Slide Number Placeholder 4">
             <a:extLst>
               <a:ext uri="{FF2B5EF4-FFF2-40B4-BE49-F238E27FC236}">
-                <a16:creationId xmlns:a16="http://schemas.microsoft.com/office/drawing/2014/main" id="{4B26CCBB-E984-6B8A-CCF7-F78040054940}"/>
+                <a16:creationId xmlns:a16="http://schemas.microsoft.com/office/drawing/2014/main" id="{C395C6EC-FE0F-0BC0-D4C5-51E09090E166}"/>
               </a:ext>
             </a:extLst>
           </p:cNvPr>
@@ -7520,40 +8324,10 @@
           </a:p>
         </p:txBody>
       </p:sp>
-      <p:pic>
-        <p:nvPicPr>
-          <p:cNvPr id="6" name="Picture 5">
-            <a:extLst>
-              <a:ext uri="{FF2B5EF4-FFF2-40B4-BE49-F238E27FC236}">
-                <a16:creationId xmlns:a16="http://schemas.microsoft.com/office/drawing/2014/main" id="{3C1E0087-A43E-9149-3ECC-204581980C26}"/>
-              </a:ext>
-            </a:extLst>
-          </p:cNvPr>
-          <p:cNvPicPr>
-            <a:picLocks noChangeAspect="1"/>
-          </p:cNvPicPr>
-          <p:nvPr/>
-        </p:nvPicPr>
-        <p:blipFill>
-          <a:blip r:embed="rId2"/>
-          <a:stretch>
-            <a:fillRect/>
-          </a:stretch>
-        </p:blipFill>
-        <p:spPr>
-          <a:xfrm>
-            <a:off x="677335" y="1298746"/>
-            <a:ext cx="6917114" cy="5115605"/>
-          </a:xfrm>
-          <a:prstGeom prst="rect">
-            <a:avLst/>
-          </a:prstGeom>
-        </p:spPr>
-      </p:pic>
     </p:spTree>
     <p:extLst>
       <p:ext uri="{BB962C8B-B14F-4D97-AF65-F5344CB8AC3E}">
-        <p14:creationId xmlns:p14="http://schemas.microsoft.com/office/powerpoint/2010/main" val="4141323621"/>
+        <p14:creationId xmlns:p14="http://schemas.microsoft.com/office/powerpoint/2010/main" val="1321214935"/>
       </p:ext>
     </p:extLst>
   </p:cSld>

</xml_diff>